<commit_message>
update of ppt (slides about the graph)
</commit_message>
<xml_diff>
--- a/01-documentation/05-booksearch-presentation.pptx
+++ b/01-documentation/05-booksearch-presentation.pptx
@@ -225,7 +225,7 @@
           <a:p>
             <a:fld id="{177EDC67-45CA-4858-80B2-EBE24FDEE160}" type="datetimeFigureOut">
               <a:rPr lang="en-US" smtClean="0"/>
-              <a:t>4/13/23</a:t>
+              <a:t>4/13/2023</a:t>
             </a:fld>
             <a:endParaRPr lang="en-US"/>
           </a:p>
@@ -549,7 +549,7 @@
           <a:noFill/>
           <a:extLst>
             <a:ext uri="{909E8E84-426E-40dd-AFC4-6F175D3DCCD1}">
-              <a14:hiddenFill xmlns:a14="http://schemas.microsoft.com/office/drawing/2010/main" xmlns="">
+              <a14:hiddenFill xmlns="" xmlns:a14="http://schemas.microsoft.com/office/drawing/2010/main">
                 <a:solidFill>
                   <a:srgbClr val="FFFFFF"/>
                 </a:solidFill>
@@ -608,7 +608,7 @@
             </a:ln>
             <a:extLst>
               <a:ext uri="{91240B29-F687-4f45-9708-019B960494DF}">
-                <a14:hiddenLine xmlns:a14="http://schemas.microsoft.com/office/drawing/2010/main" xmlns="" w="9525">
+                <a14:hiddenLine xmlns="" xmlns:a14="http://schemas.microsoft.com/office/drawing/2010/main" w="9525">
                   <a:solidFill>
                     <a:srgbClr val="000000"/>
                   </a:solidFill>
@@ -698,7 +698,7 @@
             </a:ln>
             <a:extLst>
               <a:ext uri="{91240B29-F687-4f45-9708-019B960494DF}">
-                <a14:hiddenLine xmlns:a14="http://schemas.microsoft.com/office/drawing/2010/main" xmlns="" w="9525">
+                <a14:hiddenLine xmlns="" xmlns:a14="http://schemas.microsoft.com/office/drawing/2010/main" w="9525">
                   <a:solidFill>
                     <a:srgbClr val="000000"/>
                   </a:solidFill>
@@ -788,7 +788,7 @@
             </a:ln>
             <a:extLst>
               <a:ext uri="{91240B29-F687-4f45-9708-019B960494DF}">
-                <a14:hiddenLine xmlns:a14="http://schemas.microsoft.com/office/drawing/2010/main" xmlns="" w="9525">
+                <a14:hiddenLine xmlns="" xmlns:a14="http://schemas.microsoft.com/office/drawing/2010/main" w="9525">
                   <a:solidFill>
                     <a:srgbClr val="000000"/>
                   </a:solidFill>
@@ -822,7 +822,7 @@
             </a:ln>
             <a:extLst>
               <a:ext uri="{91240B29-F687-4f45-9708-019B960494DF}">
-                <a14:hiddenLine xmlns:a14="http://schemas.microsoft.com/office/drawing/2010/main" xmlns="" w="9525">
+                <a14:hiddenLine xmlns="" xmlns:a14="http://schemas.microsoft.com/office/drawing/2010/main" w="9525">
                   <a:solidFill>
                     <a:srgbClr val="000000"/>
                   </a:solidFill>
@@ -912,7 +912,7 @@
             </a:ln>
             <a:extLst>
               <a:ext uri="{91240B29-F687-4f45-9708-019B960494DF}">
-                <a14:hiddenLine xmlns:a14="http://schemas.microsoft.com/office/drawing/2010/main" xmlns="" w="9525">
+                <a14:hiddenLine xmlns="" xmlns:a14="http://schemas.microsoft.com/office/drawing/2010/main" w="9525">
                   <a:solidFill>
                     <a:srgbClr val="000000"/>
                   </a:solidFill>
@@ -974,7 +974,7 @@
             </a:ln>
             <a:extLst>
               <a:ext uri="{91240B29-F687-4f45-9708-019B960494DF}">
-                <a14:hiddenLine xmlns:a14="http://schemas.microsoft.com/office/drawing/2010/main" xmlns="" w="9525">
+                <a14:hiddenLine xmlns="" xmlns:a14="http://schemas.microsoft.com/office/drawing/2010/main" w="9525">
                   <a:solidFill>
                     <a:srgbClr val="000000"/>
                   </a:solidFill>
@@ -1036,7 +1036,7 @@
             </a:ln>
             <a:extLst>
               <a:ext uri="{91240B29-F687-4f45-9708-019B960494DF}">
-                <a14:hiddenLine xmlns:a14="http://schemas.microsoft.com/office/drawing/2010/main" xmlns="" w="9525">
+                <a14:hiddenLine xmlns="" xmlns:a14="http://schemas.microsoft.com/office/drawing/2010/main" w="9525">
                   <a:solidFill>
                     <a:srgbClr val="000000"/>
                   </a:solidFill>
@@ -1126,7 +1126,7 @@
             </a:ln>
             <a:extLst>
               <a:ext uri="{91240B29-F687-4f45-9708-019B960494DF}">
-                <a14:hiddenLine xmlns:a14="http://schemas.microsoft.com/office/drawing/2010/main" xmlns="" w="9525">
+                <a14:hiddenLine xmlns="" xmlns:a14="http://schemas.microsoft.com/office/drawing/2010/main" w="9525">
                   <a:solidFill>
                     <a:srgbClr val="000000"/>
                   </a:solidFill>
@@ -1188,7 +1188,7 @@
             </a:ln>
             <a:extLst>
               <a:ext uri="{91240B29-F687-4f45-9708-019B960494DF}">
-                <a14:hiddenLine xmlns:a14="http://schemas.microsoft.com/office/drawing/2010/main" xmlns="" w="9525">
+                <a14:hiddenLine xmlns="" xmlns:a14="http://schemas.microsoft.com/office/drawing/2010/main" w="9525">
                   <a:solidFill>
                     <a:srgbClr val="000000"/>
                   </a:solidFill>
@@ -1250,7 +1250,7 @@
             </a:ln>
             <a:extLst>
               <a:ext uri="{91240B29-F687-4f45-9708-019B960494DF}">
-                <a14:hiddenLine xmlns:a14="http://schemas.microsoft.com/office/drawing/2010/main" xmlns="" w="9525">
+                <a14:hiddenLine xmlns="" xmlns:a14="http://schemas.microsoft.com/office/drawing/2010/main" w="9525">
                   <a:solidFill>
                     <a:srgbClr val="000000"/>
                   </a:solidFill>
@@ -1340,7 +1340,7 @@
             </a:ln>
             <a:extLst>
               <a:ext uri="{91240B29-F687-4f45-9708-019B960494DF}">
-                <a14:hiddenLine xmlns:a14="http://schemas.microsoft.com/office/drawing/2010/main" xmlns="" w="9525">
+                <a14:hiddenLine xmlns="" xmlns:a14="http://schemas.microsoft.com/office/drawing/2010/main" w="9525">
                   <a:solidFill>
                     <a:srgbClr val="000000"/>
                   </a:solidFill>
@@ -1430,7 +1430,7 @@
             </a:ln>
             <a:extLst>
               <a:ext uri="{91240B29-F687-4f45-9708-019B960494DF}">
-                <a14:hiddenLine xmlns:a14="http://schemas.microsoft.com/office/drawing/2010/main" xmlns="" w="9525">
+                <a14:hiddenLine xmlns="" xmlns:a14="http://schemas.microsoft.com/office/drawing/2010/main" w="9525">
                   <a:solidFill>
                     <a:srgbClr val="000000"/>
                   </a:solidFill>
@@ -1492,7 +1492,7 @@
             </a:ln>
             <a:extLst>
               <a:ext uri="{91240B29-F687-4f45-9708-019B960494DF}">
-                <a14:hiddenLine xmlns:a14="http://schemas.microsoft.com/office/drawing/2010/main" xmlns="" w="9525">
+                <a14:hiddenLine xmlns="" xmlns:a14="http://schemas.microsoft.com/office/drawing/2010/main" w="9525">
                   <a:solidFill>
                     <a:srgbClr val="000000"/>
                   </a:solidFill>
@@ -1602,7 +1602,7 @@
             </a:ln>
             <a:extLst>
               <a:ext uri="{91240B29-F687-4f45-9708-019B960494DF}">
-                <a14:hiddenLine xmlns:a14="http://schemas.microsoft.com/office/drawing/2010/main" xmlns="" w="9525">
+                <a14:hiddenLine xmlns="" xmlns:a14="http://schemas.microsoft.com/office/drawing/2010/main" w="9525">
                   <a:solidFill>
                     <a:srgbClr val="000000"/>
                   </a:solidFill>
@@ -1664,7 +1664,7 @@
             </a:ln>
             <a:extLst>
               <a:ext uri="{91240B29-F687-4f45-9708-019B960494DF}">
-                <a14:hiddenLine xmlns:a14="http://schemas.microsoft.com/office/drawing/2010/main" xmlns="" w="9525">
+                <a14:hiddenLine xmlns="" xmlns:a14="http://schemas.microsoft.com/office/drawing/2010/main" w="9525">
                   <a:solidFill>
                     <a:srgbClr val="000000"/>
                   </a:solidFill>
@@ -1754,7 +1754,7 @@
             </a:ln>
             <a:extLst>
               <a:ext uri="{91240B29-F687-4f45-9708-019B960494DF}">
-                <a14:hiddenLine xmlns:a14="http://schemas.microsoft.com/office/drawing/2010/main" xmlns="" w="9525">
+                <a14:hiddenLine xmlns="" xmlns:a14="http://schemas.microsoft.com/office/drawing/2010/main" w="9525">
                   <a:solidFill>
                     <a:srgbClr val="000000"/>
                   </a:solidFill>
@@ -1844,7 +1844,7 @@
             </a:ln>
             <a:extLst>
               <a:ext uri="{91240B29-F687-4f45-9708-019B960494DF}">
-                <a14:hiddenLine xmlns:a14="http://schemas.microsoft.com/office/drawing/2010/main" xmlns="" w="9525">
+                <a14:hiddenLine xmlns="" xmlns:a14="http://schemas.microsoft.com/office/drawing/2010/main" w="9525">
                   <a:solidFill>
                     <a:srgbClr val="000000"/>
                   </a:solidFill>
@@ -1906,7 +1906,7 @@
             </a:ln>
             <a:extLst>
               <a:ext uri="{91240B29-F687-4f45-9708-019B960494DF}">
-                <a14:hiddenLine xmlns:a14="http://schemas.microsoft.com/office/drawing/2010/main" xmlns="" w="9525">
+                <a14:hiddenLine xmlns="" xmlns:a14="http://schemas.microsoft.com/office/drawing/2010/main" w="9525">
                   <a:solidFill>
                     <a:srgbClr val="000000"/>
                   </a:solidFill>
@@ -1996,7 +1996,7 @@
             </a:ln>
             <a:extLst>
               <a:ext uri="{91240B29-F687-4f45-9708-019B960494DF}">
-                <a14:hiddenLine xmlns:a14="http://schemas.microsoft.com/office/drawing/2010/main" xmlns="" w="9525">
+                <a14:hiddenLine xmlns="" xmlns:a14="http://schemas.microsoft.com/office/drawing/2010/main" w="9525">
                   <a:solidFill>
                     <a:srgbClr val="000000"/>
                   </a:solidFill>
@@ -2086,7 +2086,7 @@
             </a:ln>
             <a:extLst>
               <a:ext uri="{91240B29-F687-4f45-9708-019B960494DF}">
-                <a14:hiddenLine xmlns:a14="http://schemas.microsoft.com/office/drawing/2010/main" xmlns="" w="9525">
+                <a14:hiddenLine xmlns="" xmlns:a14="http://schemas.microsoft.com/office/drawing/2010/main" w="9525">
                   <a:solidFill>
                     <a:srgbClr val="000000"/>
                   </a:solidFill>
@@ -2142,7 +2142,7 @@
             </a:ln>
             <a:extLst>
               <a:ext uri="{91240B29-F687-4f45-9708-019B960494DF}">
-                <a14:hiddenLine xmlns:a14="http://schemas.microsoft.com/office/drawing/2010/main" xmlns="" w="9525">
+                <a14:hiddenLine xmlns="" xmlns:a14="http://schemas.microsoft.com/office/drawing/2010/main" w="9525">
                   <a:solidFill>
                     <a:srgbClr val="000000"/>
                   </a:solidFill>
@@ -2232,7 +2232,7 @@
             </a:ln>
             <a:extLst>
               <a:ext uri="{91240B29-F687-4f45-9708-019B960494DF}">
-                <a14:hiddenLine xmlns:a14="http://schemas.microsoft.com/office/drawing/2010/main" xmlns="" w="9525">
+                <a14:hiddenLine xmlns="" xmlns:a14="http://schemas.microsoft.com/office/drawing/2010/main" w="9525">
                   <a:solidFill>
                     <a:srgbClr val="000000"/>
                   </a:solidFill>
@@ -2288,7 +2288,7 @@
             </a:ln>
             <a:extLst>
               <a:ext uri="{91240B29-F687-4f45-9708-019B960494DF}">
-                <a14:hiddenLine xmlns:a14="http://schemas.microsoft.com/office/drawing/2010/main" xmlns="" w="9525">
+                <a14:hiddenLine xmlns="" xmlns:a14="http://schemas.microsoft.com/office/drawing/2010/main" w="9525">
                   <a:solidFill>
                     <a:srgbClr val="000000"/>
                   </a:solidFill>
@@ -2378,7 +2378,7 @@
             </a:ln>
             <a:extLst>
               <a:ext uri="{91240B29-F687-4f45-9708-019B960494DF}">
-                <a14:hiddenLine xmlns:a14="http://schemas.microsoft.com/office/drawing/2010/main" xmlns="" w="9525">
+                <a14:hiddenLine xmlns="" xmlns:a14="http://schemas.microsoft.com/office/drawing/2010/main" w="9525">
                   <a:solidFill>
                     <a:srgbClr val="000000"/>
                   </a:solidFill>
@@ -2446,7 +2446,7 @@
             </a:ln>
             <a:extLst>
               <a:ext uri="{91240B29-F687-4f45-9708-019B960494DF}">
-                <a14:hiddenLine xmlns:a14="http://schemas.microsoft.com/office/drawing/2010/main" xmlns="" w="9525">
+                <a14:hiddenLine xmlns="" xmlns:a14="http://schemas.microsoft.com/office/drawing/2010/main" w="9525">
                   <a:solidFill>
                     <a:srgbClr val="000000"/>
                   </a:solidFill>
@@ -2536,7 +2536,7 @@
             </a:ln>
             <a:extLst>
               <a:ext uri="{91240B29-F687-4f45-9708-019B960494DF}">
-                <a14:hiddenLine xmlns:a14="http://schemas.microsoft.com/office/drawing/2010/main" xmlns="" w="9525">
+                <a14:hiddenLine xmlns="" xmlns:a14="http://schemas.microsoft.com/office/drawing/2010/main" w="9525">
                   <a:solidFill>
                     <a:srgbClr val="000000"/>
                   </a:solidFill>
@@ -2604,7 +2604,7 @@
             </a:ln>
             <a:extLst>
               <a:ext uri="{91240B29-F687-4f45-9708-019B960494DF}">
-                <a14:hiddenLine xmlns:a14="http://schemas.microsoft.com/office/drawing/2010/main" xmlns="" w="9525">
+                <a14:hiddenLine xmlns="" xmlns:a14="http://schemas.microsoft.com/office/drawing/2010/main" w="9525">
                   <a:solidFill>
                     <a:srgbClr val="000000"/>
                   </a:solidFill>
@@ -2694,7 +2694,7 @@
             </a:ln>
             <a:extLst>
               <a:ext uri="{91240B29-F687-4f45-9708-019B960494DF}">
-                <a14:hiddenLine xmlns:a14="http://schemas.microsoft.com/office/drawing/2010/main" xmlns="" w="9525">
+                <a14:hiddenLine xmlns="" xmlns:a14="http://schemas.microsoft.com/office/drawing/2010/main" w="9525">
                   <a:solidFill>
                     <a:srgbClr val="000000"/>
                   </a:solidFill>
@@ -2728,7 +2728,7 @@
             </a:ln>
             <a:extLst>
               <a:ext uri="{91240B29-F687-4f45-9708-019B960494DF}">
-                <a14:hiddenLine xmlns:a14="http://schemas.microsoft.com/office/drawing/2010/main" xmlns="" w="9525">
+                <a14:hiddenLine xmlns="" xmlns:a14="http://schemas.microsoft.com/office/drawing/2010/main" w="9525">
                   <a:solidFill>
                     <a:srgbClr val="000000"/>
                   </a:solidFill>
@@ -2818,7 +2818,7 @@
             </a:ln>
             <a:extLst>
               <a:ext uri="{91240B29-F687-4f45-9708-019B960494DF}">
-                <a14:hiddenLine xmlns:a14="http://schemas.microsoft.com/office/drawing/2010/main" xmlns="" w="9525">
+                <a14:hiddenLine xmlns="" xmlns:a14="http://schemas.microsoft.com/office/drawing/2010/main" w="9525">
                   <a:solidFill>
                     <a:srgbClr val="000000"/>
                   </a:solidFill>
@@ -2880,7 +2880,7 @@
             </a:ln>
             <a:extLst>
               <a:ext uri="{91240B29-F687-4f45-9708-019B960494DF}">
-                <a14:hiddenLine xmlns:a14="http://schemas.microsoft.com/office/drawing/2010/main" xmlns="" w="9525">
+                <a14:hiddenLine xmlns="" xmlns:a14="http://schemas.microsoft.com/office/drawing/2010/main" w="9525">
                   <a:solidFill>
                     <a:srgbClr val="000000"/>
                   </a:solidFill>
@@ -2942,7 +2942,7 @@
             </a:ln>
             <a:extLst>
               <a:ext uri="{91240B29-F687-4f45-9708-019B960494DF}">
-                <a14:hiddenLine xmlns:a14="http://schemas.microsoft.com/office/drawing/2010/main" xmlns="" w="9525">
+                <a14:hiddenLine xmlns="" xmlns:a14="http://schemas.microsoft.com/office/drawing/2010/main" w="9525">
                   <a:solidFill>
                     <a:srgbClr val="000000"/>
                   </a:solidFill>
@@ -3032,7 +3032,7 @@
             </a:ln>
             <a:extLst>
               <a:ext uri="{91240B29-F687-4f45-9708-019B960494DF}">
-                <a14:hiddenLine xmlns:a14="http://schemas.microsoft.com/office/drawing/2010/main" xmlns="" w="9525">
+                <a14:hiddenLine xmlns="" xmlns:a14="http://schemas.microsoft.com/office/drawing/2010/main" w="9525">
                   <a:solidFill>
                     <a:srgbClr val="000000"/>
                   </a:solidFill>
@@ -3100,7 +3100,7 @@
             </a:ln>
             <a:extLst>
               <a:ext uri="{91240B29-F687-4f45-9708-019B960494DF}">
-                <a14:hiddenLine xmlns:a14="http://schemas.microsoft.com/office/drawing/2010/main" xmlns="" w="9525">
+                <a14:hiddenLine xmlns="" xmlns:a14="http://schemas.microsoft.com/office/drawing/2010/main" w="9525">
                   <a:solidFill>
                     <a:srgbClr val="000000"/>
                   </a:solidFill>
@@ -3162,7 +3162,7 @@
             </a:ln>
             <a:extLst>
               <a:ext uri="{91240B29-F687-4f45-9708-019B960494DF}">
-                <a14:hiddenLine xmlns:a14="http://schemas.microsoft.com/office/drawing/2010/main" xmlns="" w="9525">
+                <a14:hiddenLine xmlns="" xmlns:a14="http://schemas.microsoft.com/office/drawing/2010/main" w="9525">
                   <a:solidFill>
                     <a:srgbClr val="000000"/>
                   </a:solidFill>
@@ -3252,7 +3252,7 @@
             </a:ln>
             <a:extLst>
               <a:ext uri="{91240B29-F687-4f45-9708-019B960494DF}">
-                <a14:hiddenLine xmlns:a14="http://schemas.microsoft.com/office/drawing/2010/main" xmlns="" w="9525">
+                <a14:hiddenLine xmlns="" xmlns:a14="http://schemas.microsoft.com/office/drawing/2010/main" w="9525">
                   <a:solidFill>
                     <a:srgbClr val="000000"/>
                   </a:solidFill>
@@ -3314,7 +3314,7 @@
             </a:ln>
             <a:extLst>
               <a:ext uri="{91240B29-F687-4f45-9708-019B960494DF}">
-                <a14:hiddenLine xmlns:a14="http://schemas.microsoft.com/office/drawing/2010/main" xmlns="" w="9525">
+                <a14:hiddenLine xmlns="" xmlns:a14="http://schemas.microsoft.com/office/drawing/2010/main" w="9525">
                   <a:solidFill>
                     <a:srgbClr val="000000"/>
                   </a:solidFill>
@@ -3404,7 +3404,7 @@
             </a:ln>
             <a:extLst>
               <a:ext uri="{91240B29-F687-4f45-9708-019B960494DF}">
-                <a14:hiddenLine xmlns:a14="http://schemas.microsoft.com/office/drawing/2010/main" xmlns="" w="9525">
+                <a14:hiddenLine xmlns="" xmlns:a14="http://schemas.microsoft.com/office/drawing/2010/main" w="9525">
                   <a:solidFill>
                     <a:srgbClr val="000000"/>
                   </a:solidFill>
@@ -3466,7 +3466,7 @@
             </a:ln>
             <a:extLst>
               <a:ext uri="{91240B29-F687-4f45-9708-019B960494DF}">
-                <a14:hiddenLine xmlns:a14="http://schemas.microsoft.com/office/drawing/2010/main" xmlns="" w="9525">
+                <a14:hiddenLine xmlns="" xmlns:a14="http://schemas.microsoft.com/office/drawing/2010/main" w="9525">
                   <a:solidFill>
                     <a:srgbClr val="000000"/>
                   </a:solidFill>
@@ -3556,7 +3556,7 @@
             </a:ln>
             <a:extLst>
               <a:ext uri="{91240B29-F687-4f45-9708-019B960494DF}">
-                <a14:hiddenLine xmlns:a14="http://schemas.microsoft.com/office/drawing/2010/main" xmlns="" w="9525">
+                <a14:hiddenLine xmlns="" xmlns:a14="http://schemas.microsoft.com/office/drawing/2010/main" w="9525">
                   <a:solidFill>
                     <a:srgbClr val="000000"/>
                   </a:solidFill>
@@ -3590,7 +3590,7 @@
             </a:ln>
             <a:extLst>
               <a:ext uri="{91240B29-F687-4f45-9708-019B960494DF}">
-                <a14:hiddenLine xmlns:a14="http://schemas.microsoft.com/office/drawing/2010/main" xmlns="" w="9525">
+                <a14:hiddenLine xmlns="" xmlns:a14="http://schemas.microsoft.com/office/drawing/2010/main" w="9525">
                   <a:solidFill>
                     <a:srgbClr val="000000"/>
                   </a:solidFill>
@@ -3655,7 +3655,7 @@
             </a:ln>
             <a:extLst>
               <a:ext uri="{91240B29-F687-4f45-9708-019B960494DF}">
-                <a14:hiddenLine xmlns:a14="http://schemas.microsoft.com/office/drawing/2010/main" xmlns="" w="9525">
+                <a14:hiddenLine xmlns="" xmlns:a14="http://schemas.microsoft.com/office/drawing/2010/main" w="9525">
                   <a:solidFill>
                     <a:srgbClr val="000000"/>
                   </a:solidFill>
@@ -3745,7 +3745,7 @@
             </a:ln>
             <a:extLst>
               <a:ext uri="{91240B29-F687-4f45-9708-019B960494DF}">
-                <a14:hiddenLine xmlns:a14="http://schemas.microsoft.com/office/drawing/2010/main" xmlns="" w="9525">
+                <a14:hiddenLine xmlns="" xmlns:a14="http://schemas.microsoft.com/office/drawing/2010/main" w="9525">
                   <a:solidFill>
                     <a:srgbClr val="000000"/>
                   </a:solidFill>
@@ -3807,7 +3807,7 @@
             </a:ln>
             <a:extLst>
               <a:ext uri="{91240B29-F687-4f45-9708-019B960494DF}">
-                <a14:hiddenLine xmlns:a14="http://schemas.microsoft.com/office/drawing/2010/main" xmlns="" w="9525">
+                <a14:hiddenLine xmlns="" xmlns:a14="http://schemas.microsoft.com/office/drawing/2010/main" w="9525">
                   <a:solidFill>
                     <a:srgbClr val="000000"/>
                   </a:solidFill>
@@ -3897,7 +3897,7 @@
             </a:ln>
             <a:extLst>
               <a:ext uri="{91240B29-F687-4f45-9708-019B960494DF}">
-                <a14:hiddenLine xmlns:a14="http://schemas.microsoft.com/office/drawing/2010/main" xmlns="" w="9525">
+                <a14:hiddenLine xmlns="" xmlns:a14="http://schemas.microsoft.com/office/drawing/2010/main" w="9525">
                   <a:solidFill>
                     <a:srgbClr val="000000"/>
                   </a:solidFill>
@@ -3987,7 +3987,7 @@
             </a:ln>
             <a:extLst>
               <a:ext uri="{91240B29-F687-4f45-9708-019B960494DF}">
-                <a14:hiddenLine xmlns:a14="http://schemas.microsoft.com/office/drawing/2010/main" xmlns="" w="9525">
+                <a14:hiddenLine xmlns="" xmlns:a14="http://schemas.microsoft.com/office/drawing/2010/main" w="9525">
                   <a:solidFill>
                     <a:srgbClr val="000000"/>
                   </a:solidFill>
@@ -4052,7 +4052,7 @@
             </a:ln>
             <a:extLst>
               <a:ext uri="{91240B29-F687-4f45-9708-019B960494DF}">
-                <a14:hiddenLine xmlns:a14="http://schemas.microsoft.com/office/drawing/2010/main" xmlns="" w="9525">
+                <a14:hiddenLine xmlns="" xmlns:a14="http://schemas.microsoft.com/office/drawing/2010/main" w="9525">
                   <a:solidFill>
                     <a:srgbClr val="000000"/>
                   </a:solidFill>
@@ -4114,7 +4114,7 @@
             </a:ln>
             <a:extLst>
               <a:ext uri="{91240B29-F687-4f45-9708-019B960494DF}">
-                <a14:hiddenLine xmlns:a14="http://schemas.microsoft.com/office/drawing/2010/main" xmlns="" w="9525">
+                <a14:hiddenLine xmlns="" xmlns:a14="http://schemas.microsoft.com/office/drawing/2010/main" w="9525">
                   <a:solidFill>
                     <a:srgbClr val="000000"/>
                   </a:solidFill>
@@ -4204,7 +4204,7 @@
             </a:ln>
             <a:extLst>
               <a:ext uri="{91240B29-F687-4f45-9708-019B960494DF}">
-                <a14:hiddenLine xmlns:a14="http://schemas.microsoft.com/office/drawing/2010/main" xmlns="" w="9525">
+                <a14:hiddenLine xmlns="" xmlns:a14="http://schemas.microsoft.com/office/drawing/2010/main" w="9525">
                   <a:solidFill>
                     <a:srgbClr val="000000"/>
                   </a:solidFill>
@@ -4294,7 +4294,7 @@
             </a:ln>
             <a:extLst>
               <a:ext uri="{91240B29-F687-4f45-9708-019B960494DF}">
-                <a14:hiddenLine xmlns:a14="http://schemas.microsoft.com/office/drawing/2010/main" xmlns="" w="9525">
+                <a14:hiddenLine xmlns="" xmlns:a14="http://schemas.microsoft.com/office/drawing/2010/main" w="9525">
                   <a:solidFill>
                     <a:srgbClr val="000000"/>
                   </a:solidFill>
@@ -4356,7 +4356,7 @@
             </a:ln>
             <a:extLst>
               <a:ext uri="{91240B29-F687-4f45-9708-019B960494DF}">
-                <a14:hiddenLine xmlns:a14="http://schemas.microsoft.com/office/drawing/2010/main" xmlns="" w="9525">
+                <a14:hiddenLine xmlns="" xmlns:a14="http://schemas.microsoft.com/office/drawing/2010/main" w="9525">
                   <a:solidFill>
                     <a:srgbClr val="000000"/>
                   </a:solidFill>
@@ -4476,7 +4476,7 @@
             </a:ln>
             <a:extLst>
               <a:ext uri="{91240B29-F687-4f45-9708-019B960494DF}">
-                <a14:hiddenLine xmlns:a14="http://schemas.microsoft.com/office/drawing/2010/main" xmlns="" w="9525">
+                <a14:hiddenLine xmlns="" xmlns:a14="http://schemas.microsoft.com/office/drawing/2010/main" w="9525">
                   <a:solidFill>
                     <a:srgbClr val="000000"/>
                   </a:solidFill>
@@ -4544,7 +4544,7 @@
             </a:ln>
             <a:extLst>
               <a:ext uri="{91240B29-F687-4f45-9708-019B960494DF}">
-                <a14:hiddenLine xmlns:a14="http://schemas.microsoft.com/office/drawing/2010/main" xmlns="" w="9525">
+                <a14:hiddenLine xmlns="" xmlns:a14="http://schemas.microsoft.com/office/drawing/2010/main" w="9525">
                   <a:solidFill>
                     <a:srgbClr val="000000"/>
                   </a:solidFill>
@@ -4634,7 +4634,7 @@
             </a:ln>
             <a:extLst>
               <a:ext uri="{91240B29-F687-4f45-9708-019B960494DF}">
-                <a14:hiddenLine xmlns:a14="http://schemas.microsoft.com/office/drawing/2010/main" xmlns="" w="9525">
+                <a14:hiddenLine xmlns="" xmlns:a14="http://schemas.microsoft.com/office/drawing/2010/main" w="9525">
                   <a:solidFill>
                     <a:srgbClr val="000000"/>
                   </a:solidFill>
@@ -4774,7 +4774,7 @@
           <a:p>
             <a:fld id="{F60ADE25-4E02-48E0-AFE9-3411F74CA5F8}" type="datetime1">
               <a:rPr lang="en-US" smtClean="0"/>
-              <a:t>4/13/23</a:t>
+              <a:t>4/13/2023</a:t>
             </a:fld>
             <a:endParaRPr lang="en-US"/>
           </a:p>
@@ -5041,7 +5041,7 @@
           <a:p>
             <a:fld id="{A37894F6-DAB0-483A-84FA-A27AC1C331C7}" type="datetime1">
               <a:rPr lang="en-US" smtClean="0"/>
-              <a:t>4/13/23</a:t>
+              <a:t>4/13/2023</a:t>
             </a:fld>
             <a:endParaRPr lang="en-US"/>
           </a:p>
@@ -5238,7 +5238,7 @@
           <a:p>
             <a:fld id="{A37894F6-DAB0-483A-84FA-A27AC1C331C7}" type="datetime1">
               <a:rPr lang="en-US" smtClean="0"/>
-              <a:t>4/13/23</a:t>
+              <a:t>4/13/2023</a:t>
             </a:fld>
             <a:endParaRPr lang="en-US"/>
           </a:p>
@@ -5502,7 +5502,7 @@
           <a:p>
             <a:fld id="{A37894F6-DAB0-483A-84FA-A27AC1C331C7}" type="datetime1">
               <a:rPr lang="en-US" smtClean="0"/>
-              <a:t>4/13/23</a:t>
+              <a:t>4/13/2023</a:t>
             </a:fld>
             <a:endParaRPr lang="en-US"/>
           </a:p>
@@ -5937,7 +5937,7 @@
           <a:p>
             <a:fld id="{A37894F6-DAB0-483A-84FA-A27AC1C331C7}" type="datetime1">
               <a:rPr lang="en-US" smtClean="0"/>
-              <a:t>4/13/23</a:t>
+              <a:t>4/13/2023</a:t>
             </a:fld>
             <a:endParaRPr lang="en-US"/>
           </a:p>
@@ -6484,7 +6484,7 @@
           <a:p>
             <a:fld id="{A37894F6-DAB0-483A-84FA-A27AC1C331C7}" type="datetime1">
               <a:rPr lang="en-US" smtClean="0"/>
-              <a:t>4/13/23</a:t>
+              <a:t>4/13/2023</a:t>
             </a:fld>
             <a:endParaRPr lang="en-US"/>
           </a:p>
@@ -7205,7 +7205,7 @@
           <a:p>
             <a:fld id="{A37894F6-DAB0-483A-84FA-A27AC1C331C7}" type="datetime1">
               <a:rPr lang="en-US" smtClean="0"/>
-              <a:t>4/13/23</a:t>
+              <a:t>4/13/2023</a:t>
             </a:fld>
             <a:endParaRPr lang="en-US"/>
           </a:p>
@@ -7376,7 +7376,7 @@
           <a:p>
             <a:fld id="{36751BF7-E373-4518-8D94-9650E5D29367}" type="datetime1">
               <a:rPr lang="en-US" smtClean="0"/>
-              <a:t>4/13/23</a:t>
+              <a:t>4/13/2023</a:t>
             </a:fld>
             <a:endParaRPr lang="en-US"/>
           </a:p>
@@ -7556,7 +7556,7 @@
           <a:p>
             <a:fld id="{EB78F096-A5D6-4336-ADD9-730F0CCDF58D}" type="datetime1">
               <a:rPr lang="en-US" smtClean="0"/>
-              <a:t>4/13/23</a:t>
+              <a:t>4/13/2023</a:t>
             </a:fld>
             <a:endParaRPr lang="en-US"/>
           </a:p>
@@ -7726,7 +7726,7 @@
           <a:p>
             <a:fld id="{FE0D573B-62FE-4A9E-A4F2-BE09300D6C96}" type="datetime1">
               <a:rPr lang="en-US" smtClean="0"/>
-              <a:t>4/13/23</a:t>
+              <a:t>4/13/2023</a:t>
             </a:fld>
             <a:endParaRPr lang="en-US"/>
           </a:p>
@@ -7976,7 +7976,7 @@
           <a:p>
             <a:fld id="{C297B390-2396-4BEF-BE00-6EE6D2496BF2}" type="datetime1">
               <a:rPr lang="en-US" smtClean="0"/>
-              <a:t>4/13/23</a:t>
+              <a:t>4/13/2023</a:t>
             </a:fld>
             <a:endParaRPr lang="en-US"/>
           </a:p>
@@ -8208,7 +8208,7 @@
           <a:p>
             <a:fld id="{E631B17C-F66C-4177-A3BA-56A80682F604}" type="datetime1">
               <a:rPr lang="en-US" smtClean="0"/>
-              <a:t>4/13/23</a:t>
+              <a:t>4/13/2023</a:t>
             </a:fld>
             <a:endParaRPr lang="en-US"/>
           </a:p>
@@ -8589,7 +8589,7 @@
           <a:p>
             <a:fld id="{EE482F9E-F235-4D8E-808E-21744C9BCFEA}" type="datetime1">
               <a:rPr lang="en-US" smtClean="0"/>
-              <a:t>4/13/23</a:t>
+              <a:t>4/13/2023</a:t>
             </a:fld>
             <a:endParaRPr lang="en-US"/>
           </a:p>
@@ -8707,7 +8707,7 @@
           <a:p>
             <a:fld id="{A93C8557-D81E-4332-ACAB-F320FB2F6284}" type="datetime1">
               <a:rPr lang="en-US" smtClean="0"/>
-              <a:t>4/13/23</a:t>
+              <a:t>4/13/2023</a:t>
             </a:fld>
             <a:endParaRPr lang="en-US"/>
           </a:p>
@@ -8802,7 +8802,7 @@
           <a:p>
             <a:fld id="{EB12948F-F3C5-4603-8BED-1D1D42850CE0}" type="datetime1">
               <a:rPr lang="en-US" smtClean="0"/>
-              <a:t>4/13/23</a:t>
+              <a:t>4/13/2023</a:t>
             </a:fld>
             <a:endParaRPr lang="en-US"/>
           </a:p>
@@ -9051,7 +9051,7 @@
           <a:p>
             <a:fld id="{B2D01129-2DB7-473B-95AB-1BB5125E5305}" type="datetime1">
               <a:rPr lang="en-US" smtClean="0"/>
-              <a:t>4/13/23</a:t>
+              <a:t>4/13/2023</a:t>
             </a:fld>
             <a:endParaRPr lang="en-US"/>
           </a:p>
@@ -9331,7 +9331,7 @@
           <a:p>
             <a:fld id="{B75189D5-F076-46D6-8768-312AB5BE8EAB}" type="datetime1">
               <a:rPr lang="en-US" smtClean="0"/>
-              <a:t>4/13/23</a:t>
+              <a:t>4/13/2023</a:t>
             </a:fld>
             <a:endParaRPr lang="en-US"/>
           </a:p>
@@ -9454,7 +9454,7 @@
           <a:noFill/>
           <a:extLst>
             <a:ext uri="{909E8E84-426E-40dd-AFC4-6F175D3DCCD1}">
-              <a14:hiddenFill xmlns:a14="http://schemas.microsoft.com/office/drawing/2010/main" xmlns="">
+              <a14:hiddenFill xmlns="" xmlns:a14="http://schemas.microsoft.com/office/drawing/2010/main">
                 <a:solidFill>
                   <a:srgbClr val="FFFFFF"/>
                 </a:solidFill>
@@ -9528,7 +9528,7 @@
               </a:ln>
               <a:extLst>
                 <a:ext uri="{91240B29-F687-4f45-9708-019B960494DF}">
-                  <a14:hiddenLine xmlns:a14="http://schemas.microsoft.com/office/drawing/2010/main" xmlns="" w="9525">
+                  <a14:hiddenLine xmlns="" xmlns:a14="http://schemas.microsoft.com/office/drawing/2010/main" w="9525">
                     <a:solidFill>
                       <a:srgbClr val="000000"/>
                     </a:solidFill>
@@ -9618,7 +9618,7 @@
               </a:ln>
               <a:extLst>
                 <a:ext uri="{91240B29-F687-4f45-9708-019B960494DF}">
-                  <a14:hiddenLine xmlns:a14="http://schemas.microsoft.com/office/drawing/2010/main" xmlns="" w="9525">
+                  <a14:hiddenLine xmlns="" xmlns:a14="http://schemas.microsoft.com/office/drawing/2010/main" w="9525">
                     <a:solidFill>
                       <a:srgbClr val="000000"/>
                     </a:solidFill>
@@ -9708,7 +9708,7 @@
               </a:ln>
               <a:extLst>
                 <a:ext uri="{91240B29-F687-4f45-9708-019B960494DF}">
-                  <a14:hiddenLine xmlns:a14="http://schemas.microsoft.com/office/drawing/2010/main" xmlns="" w="9525">
+                  <a14:hiddenLine xmlns="" xmlns:a14="http://schemas.microsoft.com/office/drawing/2010/main" w="9525">
                     <a:solidFill>
                       <a:srgbClr val="000000"/>
                     </a:solidFill>
@@ -9770,7 +9770,7 @@
               </a:ln>
               <a:extLst>
                 <a:ext uri="{91240B29-F687-4f45-9708-019B960494DF}">
-                  <a14:hiddenLine xmlns:a14="http://schemas.microsoft.com/office/drawing/2010/main" xmlns="" w="9525">
+                  <a14:hiddenLine xmlns="" xmlns:a14="http://schemas.microsoft.com/office/drawing/2010/main" w="9525">
                     <a:solidFill>
                       <a:srgbClr val="000000"/>
                     </a:solidFill>
@@ -9860,7 +9860,7 @@
               </a:ln>
               <a:extLst>
                 <a:ext uri="{91240B29-F687-4f45-9708-019B960494DF}">
-                  <a14:hiddenLine xmlns:a14="http://schemas.microsoft.com/office/drawing/2010/main" xmlns="" w="9525">
+                  <a14:hiddenLine xmlns="" xmlns:a14="http://schemas.microsoft.com/office/drawing/2010/main" w="9525">
                     <a:solidFill>
                       <a:srgbClr val="000000"/>
                     </a:solidFill>
@@ -9922,7 +9922,7 @@
               </a:ln>
               <a:extLst>
                 <a:ext uri="{91240B29-F687-4f45-9708-019B960494DF}">
-                  <a14:hiddenLine xmlns:a14="http://schemas.microsoft.com/office/drawing/2010/main" xmlns="" w="9525">
+                  <a14:hiddenLine xmlns="" xmlns:a14="http://schemas.microsoft.com/office/drawing/2010/main" w="9525">
                     <a:solidFill>
                       <a:srgbClr val="000000"/>
                     </a:solidFill>
@@ -9984,7 +9984,7 @@
               </a:ln>
               <a:extLst>
                 <a:ext uri="{91240B29-F687-4f45-9708-019B960494DF}">
-                  <a14:hiddenLine xmlns:a14="http://schemas.microsoft.com/office/drawing/2010/main" xmlns="" w="9525">
+                  <a14:hiddenLine xmlns="" xmlns:a14="http://schemas.microsoft.com/office/drawing/2010/main" w="9525">
                     <a:solidFill>
                       <a:srgbClr val="000000"/>
                     </a:solidFill>
@@ -10074,7 +10074,7 @@
               </a:ln>
               <a:extLst>
                 <a:ext uri="{91240B29-F687-4f45-9708-019B960494DF}">
-                  <a14:hiddenLine xmlns:a14="http://schemas.microsoft.com/office/drawing/2010/main" xmlns="" w="9525">
+                  <a14:hiddenLine xmlns="" xmlns:a14="http://schemas.microsoft.com/office/drawing/2010/main" w="9525">
                     <a:solidFill>
                       <a:srgbClr val="000000"/>
                     </a:solidFill>
@@ -10164,7 +10164,7 @@
               </a:ln>
               <a:extLst>
                 <a:ext uri="{91240B29-F687-4f45-9708-019B960494DF}">
-                  <a14:hiddenLine xmlns:a14="http://schemas.microsoft.com/office/drawing/2010/main" xmlns="" w="9525">
+                  <a14:hiddenLine xmlns="" xmlns:a14="http://schemas.microsoft.com/office/drawing/2010/main" w="9525">
                     <a:solidFill>
                       <a:srgbClr val="000000"/>
                     </a:solidFill>
@@ -10226,7 +10226,7 @@
               </a:ln>
               <a:extLst>
                 <a:ext uri="{91240B29-F687-4f45-9708-019B960494DF}">
-                  <a14:hiddenLine xmlns:a14="http://schemas.microsoft.com/office/drawing/2010/main" xmlns="" w="9525">
+                  <a14:hiddenLine xmlns="" xmlns:a14="http://schemas.microsoft.com/office/drawing/2010/main" w="9525">
                     <a:solidFill>
                       <a:srgbClr val="000000"/>
                     </a:solidFill>
@@ -10336,7 +10336,7 @@
               </a:ln>
               <a:extLst>
                 <a:ext uri="{91240B29-F687-4f45-9708-019B960494DF}">
-                  <a14:hiddenLine xmlns:a14="http://schemas.microsoft.com/office/drawing/2010/main" xmlns="" w="9525">
+                  <a14:hiddenLine xmlns="" xmlns:a14="http://schemas.microsoft.com/office/drawing/2010/main" w="9525">
                     <a:solidFill>
                       <a:srgbClr val="000000"/>
                     </a:solidFill>
@@ -10420,7 +10420,7 @@
               </a:ln>
               <a:extLst>
                 <a:ext uri="{91240B29-F687-4f45-9708-019B960494DF}">
-                  <a14:hiddenLine xmlns:a14="http://schemas.microsoft.com/office/drawing/2010/main" xmlns="" w="9525">
+                  <a14:hiddenLine xmlns="" xmlns:a14="http://schemas.microsoft.com/office/drawing/2010/main" w="9525">
                     <a:solidFill>
                       <a:srgbClr val="000000"/>
                     </a:solidFill>
@@ -10482,7 +10482,7 @@
               </a:ln>
               <a:extLst>
                 <a:ext uri="{91240B29-F687-4f45-9708-019B960494DF}">
-                  <a14:hiddenLine xmlns:a14="http://schemas.microsoft.com/office/drawing/2010/main" xmlns="" w="9525">
+                  <a14:hiddenLine xmlns="" xmlns:a14="http://schemas.microsoft.com/office/drawing/2010/main" w="9525">
                     <a:solidFill>
                       <a:srgbClr val="000000"/>
                     </a:solidFill>
@@ -10544,7 +10544,7 @@
               </a:ln>
               <a:extLst>
                 <a:ext uri="{91240B29-F687-4f45-9708-019B960494DF}">
-                  <a14:hiddenLine xmlns:a14="http://schemas.microsoft.com/office/drawing/2010/main" xmlns="" w="9525">
+                  <a14:hiddenLine xmlns="" xmlns:a14="http://schemas.microsoft.com/office/drawing/2010/main" w="9525">
                     <a:solidFill>
                       <a:srgbClr val="000000"/>
                     </a:solidFill>
@@ -10634,7 +10634,7 @@
               </a:ln>
               <a:extLst>
                 <a:ext uri="{91240B29-F687-4f45-9708-019B960494DF}">
-                  <a14:hiddenLine xmlns:a14="http://schemas.microsoft.com/office/drawing/2010/main" xmlns="" w="9525">
+                  <a14:hiddenLine xmlns="" xmlns:a14="http://schemas.microsoft.com/office/drawing/2010/main" w="9525">
                     <a:solidFill>
                       <a:srgbClr val="000000"/>
                     </a:solidFill>
@@ -10668,7 +10668,7 @@
               </a:ln>
               <a:extLst>
                 <a:ext uri="{91240B29-F687-4f45-9708-019B960494DF}">
-                  <a14:hiddenLine xmlns:a14="http://schemas.microsoft.com/office/drawing/2010/main" xmlns="" w="9525">
+                  <a14:hiddenLine xmlns="" xmlns:a14="http://schemas.microsoft.com/office/drawing/2010/main" w="9525">
                     <a:solidFill>
                       <a:srgbClr val="000000"/>
                     </a:solidFill>
@@ -10733,7 +10733,7 @@
               </a:ln>
               <a:extLst>
                 <a:ext uri="{91240B29-F687-4f45-9708-019B960494DF}">
-                  <a14:hiddenLine xmlns:a14="http://schemas.microsoft.com/office/drawing/2010/main" xmlns="" w="9525">
+                  <a14:hiddenLine xmlns="" xmlns:a14="http://schemas.microsoft.com/office/drawing/2010/main" w="9525">
                     <a:solidFill>
                       <a:srgbClr val="000000"/>
                     </a:solidFill>
@@ -10823,7 +10823,7 @@
               </a:ln>
               <a:extLst>
                 <a:ext uri="{91240B29-F687-4f45-9708-019B960494DF}">
-                  <a14:hiddenLine xmlns:a14="http://schemas.microsoft.com/office/drawing/2010/main" xmlns="" w="9525">
+                  <a14:hiddenLine xmlns="" xmlns:a14="http://schemas.microsoft.com/office/drawing/2010/main" w="9525">
                     <a:solidFill>
                       <a:srgbClr val="000000"/>
                     </a:solidFill>
@@ -10885,7 +10885,7 @@
               </a:ln>
               <a:extLst>
                 <a:ext uri="{91240B29-F687-4f45-9708-019B960494DF}">
-                  <a14:hiddenLine xmlns:a14="http://schemas.microsoft.com/office/drawing/2010/main" xmlns="" w="9525">
+                  <a14:hiddenLine xmlns="" xmlns:a14="http://schemas.microsoft.com/office/drawing/2010/main" w="9525">
                     <a:solidFill>
                       <a:srgbClr val="000000"/>
                     </a:solidFill>
@@ -10975,7 +10975,7 @@
               </a:ln>
               <a:extLst>
                 <a:ext uri="{91240B29-F687-4f45-9708-019B960494DF}">
-                  <a14:hiddenLine xmlns:a14="http://schemas.microsoft.com/office/drawing/2010/main" xmlns="" w="9525">
+                  <a14:hiddenLine xmlns="" xmlns:a14="http://schemas.microsoft.com/office/drawing/2010/main" w="9525">
                     <a:solidFill>
                       <a:srgbClr val="000000"/>
                     </a:solidFill>
@@ -11040,7 +11040,7 @@
               </a:ln>
               <a:extLst>
                 <a:ext uri="{91240B29-F687-4f45-9708-019B960494DF}">
-                  <a14:hiddenLine xmlns:a14="http://schemas.microsoft.com/office/drawing/2010/main" xmlns="" w="9525">
+                  <a14:hiddenLine xmlns="" xmlns:a14="http://schemas.microsoft.com/office/drawing/2010/main" w="9525">
                     <a:solidFill>
                       <a:srgbClr val="000000"/>
                     </a:solidFill>
@@ -11102,7 +11102,7 @@
               </a:ln>
               <a:extLst>
                 <a:ext uri="{91240B29-F687-4f45-9708-019B960494DF}">
-                  <a14:hiddenLine xmlns:a14="http://schemas.microsoft.com/office/drawing/2010/main" xmlns="" w="9525">
+                  <a14:hiddenLine xmlns="" xmlns:a14="http://schemas.microsoft.com/office/drawing/2010/main" w="9525">
                     <a:solidFill>
                       <a:srgbClr val="000000"/>
                     </a:solidFill>
@@ -11192,7 +11192,7 @@
               </a:ln>
               <a:extLst>
                 <a:ext uri="{91240B29-F687-4f45-9708-019B960494DF}">
-                  <a14:hiddenLine xmlns:a14="http://schemas.microsoft.com/office/drawing/2010/main" xmlns="" w="9525">
+                  <a14:hiddenLine xmlns="" xmlns:a14="http://schemas.microsoft.com/office/drawing/2010/main" w="9525">
                     <a:solidFill>
                       <a:srgbClr val="000000"/>
                     </a:solidFill>
@@ -11282,7 +11282,7 @@
               </a:ln>
               <a:extLst>
                 <a:ext uri="{91240B29-F687-4f45-9708-019B960494DF}">
-                  <a14:hiddenLine xmlns:a14="http://schemas.microsoft.com/office/drawing/2010/main" xmlns="" w="9525">
+                  <a14:hiddenLine xmlns="" xmlns:a14="http://schemas.microsoft.com/office/drawing/2010/main" w="9525">
                     <a:solidFill>
                       <a:srgbClr val="000000"/>
                     </a:solidFill>
@@ -11347,7 +11347,7 @@
               </a:ln>
               <a:extLst>
                 <a:ext uri="{91240B29-F687-4f45-9708-019B960494DF}">
-                  <a14:hiddenLine xmlns:a14="http://schemas.microsoft.com/office/drawing/2010/main" xmlns="" w="9525">
+                  <a14:hiddenLine xmlns="" xmlns:a14="http://schemas.microsoft.com/office/drawing/2010/main" w="9525">
                     <a:solidFill>
                       <a:srgbClr val="000000"/>
                     </a:solidFill>
@@ -11467,7 +11467,7 @@
               </a:ln>
               <a:extLst>
                 <a:ext uri="{91240B29-F687-4f45-9708-019B960494DF}">
-                  <a14:hiddenLine xmlns:a14="http://schemas.microsoft.com/office/drawing/2010/main" xmlns="" w="9525">
+                  <a14:hiddenLine xmlns="" xmlns:a14="http://schemas.microsoft.com/office/drawing/2010/main" w="9525">
                     <a:solidFill>
                       <a:srgbClr val="000000"/>
                     </a:solidFill>
@@ -11548,7 +11548,7 @@
               </a:ln>
               <a:extLst>
                 <a:ext uri="{91240B29-F687-4f45-9708-019B960494DF}">
-                  <a14:hiddenLine xmlns:a14="http://schemas.microsoft.com/office/drawing/2010/main" xmlns="" w="9525">
+                  <a14:hiddenLine xmlns="" xmlns:a14="http://schemas.microsoft.com/office/drawing/2010/main" w="9525">
                     <a:solidFill>
                       <a:srgbClr val="000000"/>
                     </a:solidFill>
@@ -11663,7 +11663,7 @@
               </a:ln>
               <a:extLst>
                 <a:ext uri="{91240B29-F687-4f45-9708-019B960494DF}">
-                  <a14:hiddenLine xmlns:a14="http://schemas.microsoft.com/office/drawing/2010/main" xmlns="" w="9525">
+                  <a14:hiddenLine xmlns="" xmlns:a14="http://schemas.microsoft.com/office/drawing/2010/main" w="9525">
                     <a:solidFill>
                       <a:srgbClr val="000000"/>
                     </a:solidFill>
@@ -11753,7 +11753,7 @@
               </a:ln>
               <a:extLst>
                 <a:ext uri="{91240B29-F687-4f45-9708-019B960494DF}">
-                  <a14:hiddenLine xmlns:a14="http://schemas.microsoft.com/office/drawing/2010/main" xmlns="" w="9525">
+                  <a14:hiddenLine xmlns="" xmlns:a14="http://schemas.microsoft.com/office/drawing/2010/main" w="9525">
                     <a:solidFill>
                       <a:srgbClr val="000000"/>
                     </a:solidFill>
@@ -11818,7 +11818,7 @@
               </a:ln>
               <a:extLst>
                 <a:ext uri="{91240B29-F687-4f45-9708-019B960494DF}">
-                  <a14:hiddenLine xmlns:a14="http://schemas.microsoft.com/office/drawing/2010/main" xmlns="" w="9525">
+                  <a14:hiddenLine xmlns="" xmlns:a14="http://schemas.microsoft.com/office/drawing/2010/main" w="9525">
                     <a:solidFill>
                       <a:srgbClr val="000000"/>
                     </a:solidFill>
@@ -11908,7 +11908,7 @@
               </a:ln>
               <a:extLst>
                 <a:ext uri="{91240B29-F687-4f45-9708-019B960494DF}">
-                  <a14:hiddenLine xmlns:a14="http://schemas.microsoft.com/office/drawing/2010/main" xmlns="" w="9525">
+                  <a14:hiddenLine xmlns="" xmlns:a14="http://schemas.microsoft.com/office/drawing/2010/main" w="9525">
                     <a:solidFill>
                       <a:srgbClr val="000000"/>
                     </a:solidFill>
@@ -11976,7 +11976,7 @@
               </a:ln>
               <a:extLst>
                 <a:ext uri="{91240B29-F687-4f45-9708-019B960494DF}">
-                  <a14:hiddenLine xmlns:a14="http://schemas.microsoft.com/office/drawing/2010/main" xmlns="" w="9525">
+                  <a14:hiddenLine xmlns="" xmlns:a14="http://schemas.microsoft.com/office/drawing/2010/main" w="9525">
                     <a:solidFill>
                       <a:srgbClr val="000000"/>
                     </a:solidFill>
@@ -12066,7 +12066,7 @@
               </a:ln>
               <a:extLst>
                 <a:ext uri="{91240B29-F687-4f45-9708-019B960494DF}">
-                  <a14:hiddenLine xmlns:a14="http://schemas.microsoft.com/office/drawing/2010/main" xmlns="" w="9525">
+                  <a14:hiddenLine xmlns="" xmlns:a14="http://schemas.microsoft.com/office/drawing/2010/main" w="9525">
                     <a:solidFill>
                       <a:srgbClr val="000000"/>
                     </a:solidFill>
@@ -12134,7 +12134,7 @@
               </a:ln>
               <a:extLst>
                 <a:ext uri="{91240B29-F687-4f45-9708-019B960494DF}">
-                  <a14:hiddenLine xmlns:a14="http://schemas.microsoft.com/office/drawing/2010/main" xmlns="" w="9525">
+                  <a14:hiddenLine xmlns="" xmlns:a14="http://schemas.microsoft.com/office/drawing/2010/main" w="9525">
                     <a:solidFill>
                       <a:srgbClr val="000000"/>
                     </a:solidFill>
@@ -12224,7 +12224,7 @@
               </a:ln>
               <a:extLst>
                 <a:ext uri="{91240B29-F687-4f45-9708-019B960494DF}">
-                  <a14:hiddenLine xmlns:a14="http://schemas.microsoft.com/office/drawing/2010/main" xmlns="" w="9525">
+                  <a14:hiddenLine xmlns="" xmlns:a14="http://schemas.microsoft.com/office/drawing/2010/main" w="9525">
                     <a:solidFill>
                       <a:srgbClr val="000000"/>
                     </a:solidFill>
@@ -12258,7 +12258,7 @@
               </a:ln>
               <a:extLst>
                 <a:ext uri="{91240B29-F687-4f45-9708-019B960494DF}">
-                  <a14:hiddenLine xmlns:a14="http://schemas.microsoft.com/office/drawing/2010/main" xmlns="" w="9525">
+                  <a14:hiddenLine xmlns="" xmlns:a14="http://schemas.microsoft.com/office/drawing/2010/main" w="9525">
                     <a:solidFill>
                       <a:srgbClr val="000000"/>
                     </a:solidFill>
@@ -12398,7 +12398,7 @@
           <a:p>
             <a:fld id="{A37894F6-DAB0-483A-84FA-A27AC1C331C7}" type="datetime1">
               <a:rPr lang="en-US" smtClean="0"/>
-              <a:t>4/13/23</a:t>
+              <a:t>4/13/2023</a:t>
             </a:fld>
             <a:endParaRPr lang="en-US"/>
           </a:p>
@@ -17602,7 +17602,7 @@
         </p:nvSpPr>
         <p:spPr>
           <a:xfrm>
-            <a:off x="7593149" y="4100310"/>
+            <a:off x="7593149" y="3860605"/>
             <a:ext cx="3655619" cy="1140825"/>
           </a:xfrm>
           <a:prstGeom prst="rect">
@@ -17646,8 +17646,8 @@
           </a:p>
         </p:txBody>
       </p:sp>
-      <mc:AlternateContent xmlns:mc="http://schemas.openxmlformats.org/markup-compatibility/2006" xmlns:a14="http://schemas.microsoft.com/office/drawing/2010/main">
-        <mc:Choice Requires="a14">
+      <mc:AlternateContent xmlns:mc="http://schemas.openxmlformats.org/markup-compatibility/2006">
+        <mc:Choice xmlns:a14="http://schemas.microsoft.com/office/drawing/2010/main" Requires="a14">
           <p:sp>
             <p:nvSpPr>
               <p:cNvPr id="11" name="TextBox 10">
@@ -17662,7 +17662,7 @@
             </p:nvSpPr>
             <p:spPr>
               <a:xfrm>
-                <a:off x="7593149" y="2486861"/>
+                <a:off x="7593149" y="2247156"/>
                 <a:ext cx="3586366" cy="890821"/>
               </a:xfrm>
               <a:prstGeom prst="rect">
@@ -17811,7 +17811,7 @@
             </p:txBody>
           </p:sp>
         </mc:Choice>
-        <mc:Fallback xmlns="">
+        <mc:Fallback>
           <p:sp>
             <p:nvSpPr>
               <p:cNvPr id="11" name="TextBox 10">
@@ -17828,7 +17828,7 @@
             </p:nvSpPr>
             <p:spPr>
               <a:xfrm>
-                <a:off x="7593149" y="2486861"/>
+                <a:off x="7593149" y="2247156"/>
                 <a:ext cx="3586366" cy="890821"/>
               </a:xfrm>
               <a:prstGeom prst="rect">
@@ -17884,8 +17884,38 @@
         </p:blipFill>
         <p:spPr>
           <a:xfrm>
-            <a:off x="1427584" y="1938795"/>
+            <a:off x="1427584" y="1805625"/>
             <a:ext cx="5527027" cy="3678332"/>
+          </a:xfrm>
+          <a:prstGeom prst="rect">
+            <a:avLst/>
+          </a:prstGeom>
+        </p:spPr>
+      </p:pic>
+      <p:pic>
+        <p:nvPicPr>
+          <p:cNvPr id="5" name="Picture 4">
+            <a:extLst>
+              <a:ext uri="{FF2B5EF4-FFF2-40B4-BE49-F238E27FC236}">
+                <a16:creationId xmlns:a16="http://schemas.microsoft.com/office/drawing/2014/main" id="{104E9E72-9058-933C-2C62-26445437CD00}"/>
+              </a:ext>
+            </a:extLst>
+          </p:cNvPr>
+          <p:cNvPicPr>
+            <a:picLocks noChangeAspect="1"/>
+          </p:cNvPicPr>
+          <p:nvPr/>
+        </p:nvPicPr>
+        <p:blipFill>
+          <a:blip r:embed="rId4"/>
+          <a:stretch>
+            <a:fillRect/>
+          </a:stretch>
+        </p:blipFill>
+        <p:spPr>
+          <a:xfrm>
+            <a:off x="1583165" y="5944051"/>
+            <a:ext cx="9161368" cy="533367"/>
           </a:xfrm>
           <a:prstGeom prst="rect">
             <a:avLst/>
@@ -18042,7 +18072,7 @@
         </p:blipFill>
         <p:spPr>
           <a:xfrm>
-            <a:off x="2659537" y="1477995"/>
+            <a:off x="2659537" y="1433605"/>
             <a:ext cx="6872924" cy="5220548"/>
           </a:xfrm>
           <a:prstGeom prst="rect">
@@ -18350,8 +18380,8 @@
         </p:nvSpPr>
         <p:spPr>
           <a:xfrm>
-            <a:off x="7509176" y="3802943"/>
-            <a:ext cx="3655619" cy="1694823"/>
+            <a:off x="7509176" y="3562167"/>
+            <a:ext cx="4173838" cy="2248821"/>
           </a:xfrm>
           <a:prstGeom prst="rect">
             <a:avLst/>
@@ -18364,17 +18394,6 @@
           </a:bodyPr>
           <a:lstStyle/>
           <a:p>
-            <a:pPr rtl="0">
-              <a:lnSpc>
-                <a:spcPct val="150000"/>
-              </a:lnSpc>
-            </a:pPr>
-            <a:r>
-              <a:rPr lang="fr-FR" sz="2400"/>
-              <a:t>Classement :</a:t>
-            </a:r>
-          </a:p>
-          <a:p>
             <a:pPr marL="342900" indent="-342900" rtl="0">
               <a:lnSpc>
                 <a:spcPct val="150000"/>
@@ -18384,7 +18403,7 @@
             </a:pPr>
             <a:r>
               <a:rPr lang="fr-FR" sz="2400"/>
-              <a:t>nombre de mots-clés</a:t>
+              <a:t>Mesure importance des mots</a:t>
             </a:r>
           </a:p>
           <a:p>
@@ -18396,6 +18415,32 @@
               <a:buChar char="•"/>
             </a:pPr>
             <a:r>
+              <a:rPr lang="fr-FR" sz="2400"/>
+              <a:t>Classement :</a:t>
+            </a:r>
+          </a:p>
+          <a:p>
+            <a:pPr marL="800100" lvl="1" indent="-342900">
+              <a:lnSpc>
+                <a:spcPct val="150000"/>
+              </a:lnSpc>
+              <a:buFont typeface="Wingdings" panose="05000000000000000000" pitchFamily="2" charset="2"/>
+              <a:buChar char="Ø"/>
+            </a:pPr>
+            <a:r>
+              <a:rPr lang="fr-FR" sz="2400"/>
+              <a:t>nombre de mots-clés</a:t>
+            </a:r>
+          </a:p>
+          <a:p>
+            <a:pPr marL="800100" lvl="1" indent="-342900">
+              <a:lnSpc>
+                <a:spcPct val="150000"/>
+              </a:lnSpc>
+              <a:buFont typeface="Wingdings" panose="05000000000000000000" pitchFamily="2" charset="2"/>
+              <a:buChar char="Ø"/>
+            </a:pPr>
+            <a:r>
               <a:rPr lang="fr-FR" sz="2400" i="1">
                 <a:effectLst/>
               </a:rPr>
@@ -18404,8 +18449,8 @@
           </a:p>
         </p:txBody>
       </p:sp>
-      <mc:AlternateContent xmlns:mc="http://schemas.openxmlformats.org/markup-compatibility/2006" xmlns:a14="http://schemas.microsoft.com/office/drawing/2010/main">
-        <mc:Choice Requires="a14">
+      <mc:AlternateContent xmlns:mc="http://schemas.openxmlformats.org/markup-compatibility/2006">
+        <mc:Choice xmlns:a14="http://schemas.microsoft.com/office/drawing/2010/main" Requires="a14">
           <p:sp>
             <p:nvSpPr>
               <p:cNvPr id="11" name="TextBox 10">
@@ -18420,7 +18465,7 @@
             </p:nvSpPr>
             <p:spPr>
               <a:xfrm>
-                <a:off x="7509176" y="2330580"/>
+                <a:off x="7509176" y="2261945"/>
                 <a:ext cx="4256230" cy="926279"/>
               </a:xfrm>
               <a:prstGeom prst="rect">
@@ -18615,7 +18660,7 @@
             </p:txBody>
           </p:sp>
         </mc:Choice>
-        <mc:Fallback xmlns="">
+        <mc:Fallback>
           <p:sp>
             <p:nvSpPr>
               <p:cNvPr id="11" name="TextBox 10">
@@ -18632,7 +18677,7 @@
             </p:nvSpPr>
             <p:spPr>
               <a:xfrm>
-                <a:off x="7509176" y="2330580"/>
+                <a:off x="7509176" y="2261945"/>
                 <a:ext cx="4256230" cy="926279"/>
               </a:xfrm>
               <a:prstGeom prst="rect">
@@ -18687,7 +18732,7 @@
         </p:blipFill>
         <p:spPr>
           <a:xfrm>
-            <a:off x="943232" y="1884784"/>
+            <a:off x="943232" y="2017951"/>
             <a:ext cx="6334765" cy="3910349"/>
           </a:xfrm>
           <a:prstGeom prst="rect">
@@ -21442,7 +21487,7 @@
           </p:cNvPicPr>
           <p:nvPr/>
         </p:nvPicPr>
-        <p:blipFill>
+        <p:blipFill rotWithShape="1">
           <a:blip r:embed="rId2">
             <a:extLst>
               <a:ext uri="{28A0092B-C50C-407E-A947-70E740481C1C}">
@@ -21450,14 +21495,13 @@
               </a:ext>
             </a:extLst>
           </a:blip>
-          <a:stretch>
-            <a:fillRect/>
-          </a:stretch>
+          <a:srcRect l="10611" t="13787" r="6797" b="2458"/>
+          <a:stretch/>
         </p:blipFill>
         <p:spPr>
           <a:xfrm>
-            <a:off x="2527443" y="1277189"/>
-            <a:ext cx="7137114" cy="5352836"/>
+            <a:off x="2740240" y="1507388"/>
+            <a:ext cx="6711520" cy="5104393"/>
           </a:xfrm>
           <a:prstGeom prst="rect">
             <a:avLst/>

</xml_diff>